<commit_message>
Some comments in powerpoint instructions
</commit_message>
<xml_diff>
--- a/Documentation/ExamProjectTSE_2022.pptx
+++ b/Documentation/ExamProjectTSE_2022.pptx
@@ -305,7 +305,7 @@
           <a:p>
             <a:fld id="{AE9863BC-CA83-4676-881E-A7A4A2393B5F}" type="datetimeFigureOut">
               <a:rPr lang="en-US" smtClean="0"/>
-              <a:t>10/9/22</a:t>
+              <a:t>10/20/22</a:t>
             </a:fld>
             <a:endParaRPr lang="en-US"/>
           </a:p>
@@ -1244,160 +1244,32 @@
           <a:lstStyle/>
           <a:p>
             <a:r>
-              <a:rPr lang="fr-BE" dirty="0"/>
-              <a:t>About</a:t>
-            </a:r>
-            <a:r>
-              <a:rPr lang="fr-BE" baseline="0" dirty="0"/>
-              <a:t> the </a:t>
-            </a:r>
-            <a:r>
-              <a:rPr lang="fr-BE" baseline="0" dirty="0" err="1"/>
-              <a:t>difference</a:t>
-            </a:r>
-            <a:r>
-              <a:rPr lang="fr-BE" baseline="0" dirty="0"/>
-              <a:t> </a:t>
-            </a:r>
-            <a:r>
-              <a:rPr lang="fr-BE" baseline="0" dirty="0" err="1"/>
-              <a:t>between</a:t>
-            </a:r>
-            <a:r>
-              <a:rPr lang="fr-BE" baseline="0" dirty="0"/>
-              <a:t> </a:t>
-            </a:r>
-            <a:r>
-              <a:rPr lang="fr-BE" baseline="0" dirty="0" err="1"/>
-              <a:t>regular</a:t>
-            </a:r>
-            <a:r>
-              <a:rPr lang="fr-BE" baseline="0" dirty="0"/>
-              <a:t> </a:t>
-            </a:r>
-            <a:r>
-              <a:rPr lang="fr-BE" baseline="0" dirty="0" err="1"/>
-              <a:t>customers</a:t>
-            </a:r>
-            <a:r>
-              <a:rPr lang="fr-BE" baseline="0" dirty="0"/>
-              <a:t> </a:t>
-            </a:r>
-            <a:r>
-              <a:rPr lang="fr-BE" baseline="0" dirty="0" err="1"/>
-              <a:t>it</a:t>
-            </a:r>
-            <a:r>
-              <a:rPr lang="fr-BE" baseline="0" dirty="0"/>
-              <a:t> </a:t>
-            </a:r>
-            <a:r>
-              <a:rPr lang="fr-BE" baseline="0" dirty="0" err="1"/>
-              <a:t>is</a:t>
-            </a:r>
-            <a:r>
-              <a:rPr lang="fr-BE" baseline="0" dirty="0"/>
-              <a:t> not </a:t>
-            </a:r>
-            <a:r>
-              <a:rPr lang="fr-BE" baseline="0" dirty="0" err="1"/>
-              <a:t>clear</a:t>
-            </a:r>
-            <a:r>
-              <a:rPr lang="fr-BE" baseline="0" dirty="0"/>
-              <a:t> for me. </a:t>
-            </a:r>
-            <a:r>
-              <a:rPr lang="fr-BE" baseline="0" dirty="0" err="1"/>
-              <a:t>They</a:t>
-            </a:r>
-            <a:r>
-              <a:rPr lang="fr-BE" baseline="0" dirty="0"/>
-              <a:t> </a:t>
-            </a:r>
-            <a:r>
-              <a:rPr lang="fr-BE" baseline="0" dirty="0" err="1"/>
-              <a:t>give</a:t>
-            </a:r>
-            <a:r>
-              <a:rPr lang="fr-BE" baseline="0" dirty="0"/>
-              <a:t> 1 to 10 euros on top of </a:t>
-            </a:r>
-            <a:r>
-              <a:rPr lang="fr-BE" baseline="0" dirty="0" err="1"/>
-              <a:t>their</a:t>
-            </a:r>
-            <a:r>
-              <a:rPr lang="fr-BE" baseline="0" dirty="0"/>
-              <a:t> </a:t>
-            </a:r>
-            <a:r>
-              <a:rPr lang="fr-BE" baseline="0" dirty="0" err="1"/>
-              <a:t>purchase</a:t>
-            </a:r>
-            <a:r>
-              <a:rPr lang="fr-BE" baseline="0" dirty="0"/>
-              <a:t> as a tip ?</a:t>
-            </a:r>
-          </a:p>
-          <a:p>
-            <a:r>
-              <a:rPr lang="fr-BE" baseline="0" dirty="0" err="1"/>
-              <a:t>Does</a:t>
-            </a:r>
-            <a:r>
-              <a:rPr lang="fr-BE" baseline="0" dirty="0"/>
-              <a:t> the </a:t>
-            </a:r>
-            <a:r>
-              <a:rPr lang="fr-BE" baseline="0" dirty="0" err="1"/>
-              <a:t>entire</a:t>
-            </a:r>
-            <a:r>
-              <a:rPr lang="fr-BE" baseline="0" dirty="0"/>
-              <a:t> </a:t>
-            </a:r>
-            <a:r>
-              <a:rPr lang="fr-BE" baseline="0" dirty="0" err="1"/>
-              <a:t>history</a:t>
-            </a:r>
-            <a:r>
-              <a:rPr lang="fr-BE" baseline="0" dirty="0"/>
-              <a:t> for </a:t>
-            </a:r>
-            <a:r>
-              <a:rPr lang="fr-BE" baseline="0" dirty="0" err="1"/>
-              <a:t>returning</a:t>
-            </a:r>
-            <a:r>
-              <a:rPr lang="fr-BE" baseline="0" dirty="0"/>
-              <a:t> </a:t>
-            </a:r>
-            <a:r>
-              <a:rPr lang="fr-BE" baseline="0" dirty="0" err="1"/>
-              <a:t>customers</a:t>
-            </a:r>
-            <a:r>
-              <a:rPr lang="fr-BE" baseline="0" dirty="0"/>
-              <a:t> </a:t>
-            </a:r>
-            <a:r>
-              <a:rPr lang="fr-BE" baseline="0" dirty="0" err="1"/>
-              <a:t>include</a:t>
-            </a:r>
-            <a:r>
-              <a:rPr lang="fr-BE" baseline="0" dirty="0"/>
-              <a:t> </a:t>
-            </a:r>
-            <a:r>
-              <a:rPr lang="fr-BE" baseline="0" dirty="0" err="1"/>
-              <a:t>timeslots&amp;dates</a:t>
-            </a:r>
-            <a:r>
-              <a:rPr lang="fr-BE" baseline="0" dirty="0"/>
-              <a:t>? </a:t>
-            </a:r>
-            <a:endParaRPr lang="fr-FR" dirty="0"/>
+              <a:rPr lang="en-GB" noProof="0" dirty="0"/>
+              <a:t>PM: About</a:t>
+            </a:r>
+            <a:r>
+              <a:rPr lang="en-GB" baseline="0" noProof="0" dirty="0"/>
+              <a:t> the difference between regular customers it is not clear for me. They give 1 to 10 euros on top of their purchase as a tip ?</a:t>
+            </a:r>
+          </a:p>
+          <a:p>
+            <a:r>
+              <a:rPr lang="en-GB" baseline="0" noProof="0" dirty="0"/>
+              <a:t>JS: Yeah, so a random number in that range added onto the price of goods purchased. For regular, no tip. </a:t>
+            </a:r>
+          </a:p>
+          <a:p>
+            <a:r>
+              <a:rPr lang="en-GB" baseline="0" noProof="0" dirty="0"/>
+              <a:t>PM: Does the entire history for returning customers include timeslots &amp; dates? </a:t>
+            </a:r>
+          </a:p>
+          <a:p>
+            <a:r>
+              <a:rPr lang="en-GB" baseline="0" noProof="0" dirty="0"/>
+              <a:t>JS: I would think so, so a list of entries, each entry containing date, time, food, drink, remaining budget</a:t>
+            </a:r>
+            <a:endParaRPr lang="en-GB" noProof="0" dirty="0"/>
           </a:p>
         </p:txBody>
       </p:sp>
@@ -2015,7 +1887,7 @@
             <a:fld id="{B61BEF0D-F0BB-DE4B-95CE-6DB70DBA9567}" type="datetimeFigureOut">
               <a:rPr lang="en-US" dirty="0"/>
               <a:pPr/>
-              <a:t>10/9/22</a:t>
+              <a:t>10/20/22</a:t>
             </a:fld>
             <a:endParaRPr lang="en-US" dirty="0"/>
           </a:p>
@@ -2346,7 +2218,7 @@
             <a:fld id="{B61BEF0D-F0BB-DE4B-95CE-6DB70DBA9567}" type="datetimeFigureOut">
               <a:rPr lang="en-US" dirty="0"/>
               <a:pPr/>
-              <a:t>10/9/22</a:t>
+              <a:t>10/20/22</a:t>
             </a:fld>
             <a:endParaRPr lang="en-US" dirty="0"/>
           </a:p>
@@ -2621,7 +2493,7 @@
             <a:fld id="{B61BEF0D-F0BB-DE4B-95CE-6DB70DBA9567}" type="datetimeFigureOut">
               <a:rPr lang="en-US" dirty="0"/>
               <a:pPr/>
-              <a:t>10/9/22</a:t>
+              <a:t>10/20/22</a:t>
             </a:fld>
             <a:endParaRPr lang="en-US" dirty="0"/>
           </a:p>
@@ -3186,7 +3058,7 @@
             <a:fld id="{B61BEF0D-F0BB-DE4B-95CE-6DB70DBA9567}" type="datetimeFigureOut">
               <a:rPr lang="en-US" dirty="0"/>
               <a:pPr/>
-              <a:t>10/9/22</a:t>
+              <a:t>10/20/22</a:t>
             </a:fld>
             <a:endParaRPr lang="en-US" dirty="0"/>
           </a:p>
@@ -3461,7 +3333,7 @@
             <a:fld id="{B61BEF0D-F0BB-DE4B-95CE-6DB70DBA9567}" type="datetimeFigureOut">
               <a:rPr lang="en-US" dirty="0"/>
               <a:pPr/>
-              <a:t>10/9/22</a:t>
+              <a:t>10/20/22</a:t>
             </a:fld>
             <a:endParaRPr lang="en-US" dirty="0"/>
           </a:p>
@@ -4020,7 +3892,7 @@
             <a:fld id="{B61BEF0D-F0BB-DE4B-95CE-6DB70DBA9567}" type="datetimeFigureOut">
               <a:rPr lang="en-US" dirty="0"/>
               <a:pPr/>
-              <a:t>10/9/22</a:t>
+              <a:t>10/20/22</a:t>
             </a:fld>
             <a:endParaRPr lang="en-US" dirty="0"/>
           </a:p>
@@ -4344,7 +4216,7 @@
             <a:fld id="{B61BEF0D-F0BB-DE4B-95CE-6DB70DBA9567}" type="datetimeFigureOut">
               <a:rPr lang="en-US" dirty="0"/>
               <a:pPr/>
-              <a:t>10/9/22</a:t>
+              <a:t>10/20/22</a:t>
             </a:fld>
             <a:endParaRPr lang="en-US" dirty="0"/>
           </a:p>
@@ -4546,7 +4418,7 @@
             <a:fld id="{B61BEF0D-F0BB-DE4B-95CE-6DB70DBA9567}" type="datetimeFigureOut">
               <a:rPr lang="en-US" dirty="0"/>
               <a:pPr/>
-              <a:t>10/9/22</a:t>
+              <a:t>10/20/22</a:t>
             </a:fld>
             <a:endParaRPr lang="en-US" dirty="0"/>
           </a:p>
@@ -4753,7 +4625,7 @@
             <a:fld id="{B61BEF0D-F0BB-DE4B-95CE-6DB70DBA9567}" type="datetimeFigureOut">
               <a:rPr lang="en-US" dirty="0"/>
               <a:pPr/>
-              <a:t>10/9/22</a:t>
+              <a:t>10/20/22</a:t>
             </a:fld>
             <a:endParaRPr lang="en-US" dirty="0"/>
           </a:p>
@@ -4950,7 +4822,7 @@
             <a:fld id="{B61BEF0D-F0BB-DE4B-95CE-6DB70DBA9567}" type="datetimeFigureOut">
               <a:rPr lang="en-US" dirty="0"/>
               <a:pPr/>
-              <a:t>10/9/22</a:t>
+              <a:t>10/20/22</a:t>
             </a:fld>
             <a:endParaRPr lang="en-US" dirty="0"/>
           </a:p>
@@ -5223,7 +5095,7 @@
             <a:fld id="{B61BEF0D-F0BB-DE4B-95CE-6DB70DBA9567}" type="datetimeFigureOut">
               <a:rPr lang="en-US" dirty="0"/>
               <a:pPr/>
-              <a:t>10/9/22</a:t>
+              <a:t>10/20/22</a:t>
             </a:fld>
             <a:endParaRPr lang="en-US" dirty="0"/>
           </a:p>
@@ -5486,7 +5358,7 @@
             <a:fld id="{B61BEF0D-F0BB-DE4B-95CE-6DB70DBA9567}" type="datetimeFigureOut">
               <a:rPr lang="en-US" dirty="0"/>
               <a:pPr/>
-              <a:t>10/9/22</a:t>
+              <a:t>10/20/22</a:t>
             </a:fld>
             <a:endParaRPr lang="en-US" dirty="0"/>
           </a:p>
@@ -5857,7 +5729,7 @@
             <a:fld id="{B61BEF0D-F0BB-DE4B-95CE-6DB70DBA9567}" type="datetimeFigureOut">
               <a:rPr lang="en-US" dirty="0"/>
               <a:pPr/>
-              <a:t>10/9/22</a:t>
+              <a:t>10/20/22</a:t>
             </a:fld>
             <a:endParaRPr lang="en-US" dirty="0"/>
           </a:p>
@@ -6002,7 +5874,7 @@
             <a:fld id="{B61BEF0D-F0BB-DE4B-95CE-6DB70DBA9567}" type="datetimeFigureOut">
               <a:rPr lang="en-US" dirty="0"/>
               <a:pPr/>
-              <a:t>10/9/22</a:t>
+              <a:t>10/20/22</a:t>
             </a:fld>
             <a:endParaRPr lang="en-US" dirty="0"/>
           </a:p>
@@ -6124,7 +5996,7 @@
             <a:fld id="{B61BEF0D-F0BB-DE4B-95CE-6DB70DBA9567}" type="datetimeFigureOut">
               <a:rPr lang="en-US" dirty="0"/>
               <a:pPr/>
-              <a:t>10/9/22</a:t>
+              <a:t>10/20/22</a:t>
             </a:fld>
             <a:endParaRPr lang="en-US" dirty="0"/>
           </a:p>
@@ -6406,7 +6278,7 @@
             <a:fld id="{B61BEF0D-F0BB-DE4B-95CE-6DB70DBA9567}" type="datetimeFigureOut">
               <a:rPr lang="en-US" dirty="0"/>
               <a:pPr/>
-              <a:t>10/9/22</a:t>
+              <a:t>10/20/22</a:t>
             </a:fld>
             <a:endParaRPr lang="en-US" dirty="0"/>
           </a:p>
@@ -6727,7 +6599,7 @@
             <a:fld id="{B61BEF0D-F0BB-DE4B-95CE-6DB70DBA9567}" type="datetimeFigureOut">
               <a:rPr lang="en-US" dirty="0"/>
               <a:pPr/>
-              <a:t>10/9/22</a:t>
+              <a:t>10/20/22</a:t>
             </a:fld>
             <a:endParaRPr lang="en-US" dirty="0"/>
           </a:p>
@@ -6941,7 +6813,7 @@
             <a:fld id="{B61BEF0D-F0BB-DE4B-95CE-6DB70DBA9567}" type="datetimeFigureOut">
               <a:rPr lang="en-US" dirty="0"/>
               <a:pPr/>
-              <a:t>10/9/22</a:t>
+              <a:t>10/20/22</a:t>
             </a:fld>
             <a:endParaRPr lang="en-US" dirty="0"/>
           </a:p>

</xml_diff>